<commit_message>
Added 2 & 3 channel scope code
</commit_message>
<xml_diff>
--- a/presentation/Mobile Sensors Workshop, Part 2.pptx
+++ b/presentation/Mobile Sensors Workshop, Part 2.pptx
@@ -6678,13 +6678,8 @@
           <a:p>
             <a:r>
               <a:rPr lang="en-US" dirty="0" smtClean="0"/>
-              <a:t>Magnetometer &amp; accelerometer need calibration for </a:t>
-            </a:r>
-            <a:r>
-              <a:rPr lang="en-US" smtClean="0"/>
-              <a:t>best performance.</a:t>
-            </a:r>
-            <a:endParaRPr lang="en-US" dirty="0" smtClean="0"/>
+              <a:t>Magnetometer &amp; accelerometer need calibration for best performance.</a:t>
+            </a:r>
           </a:p>
         </p:txBody>
       </p:sp>
@@ -7271,6 +7266,14 @@
             </a:r>
           </a:p>
           <a:p>
+            <a:r>
+              <a:rPr lang="en-US" dirty="0" smtClean="0"/>
+              <a:t>Arduino Cookbook </a:t>
+            </a:r>
+            <a:r>
+              <a:rPr lang="en-US" smtClean="0"/>
+              <a:t>(Margolis)</a:t>
+            </a:r>
             <a:endParaRPr lang="en-US" dirty="0"/>
           </a:p>
         </p:txBody>

</xml_diff>

<commit_message>
Added serial IR comms stuff
</commit_message>
<xml_diff>
--- a/presentation/Mobile Sensors Workshop, Part 2.pptx
+++ b/presentation/Mobile Sensors Workshop, Part 2.pptx
@@ -5,7 +5,7 @@
     <p:sldMasterId id="2147483648" r:id="rId1"/>
   </p:sldMasterIdLst>
   <p:notesMasterIdLst>
-    <p:notesMasterId r:id="rId40"/>
+    <p:notesMasterId r:id="rId43"/>
   </p:notesMasterIdLst>
   <p:sldIdLst>
     <p:sldId id="256" r:id="rId2"/>
@@ -43,9 +43,12 @@
     <p:sldId id="288" r:id="rId34"/>
     <p:sldId id="289" r:id="rId35"/>
     <p:sldId id="290" r:id="rId36"/>
-    <p:sldId id="292" r:id="rId37"/>
-    <p:sldId id="295" r:id="rId38"/>
-    <p:sldId id="293" r:id="rId39"/>
+    <p:sldId id="296" r:id="rId37"/>
+    <p:sldId id="297" r:id="rId38"/>
+    <p:sldId id="298" r:id="rId39"/>
+    <p:sldId id="292" r:id="rId40"/>
+    <p:sldId id="295" r:id="rId41"/>
+    <p:sldId id="293" r:id="rId42"/>
   </p:sldIdLst>
   <p:sldSz cx="12192000" cy="6858000"/>
   <p:notesSz cx="6858000" cy="9144000"/>
@@ -234,7 +237,7 @@
           <a:p>
             <a:fld id="{A7C5DE8E-CB8C-4F00-9EBE-0F5775031933}" type="datetimeFigureOut">
               <a:rPr lang="en-US" smtClean="0"/>
-              <a:t>2/14/2015</a:t>
+              <a:t>10/4/2015</a:t>
             </a:fld>
             <a:endParaRPr lang="en-US"/>
           </a:p>
@@ -733,7 +736,7 @@
           <a:p>
             <a:fld id="{F635EFCD-DE28-441F-88C5-3E2C5E31EA82}" type="datetimeFigureOut">
               <a:rPr lang="en-US" smtClean="0"/>
-              <a:t>2/14/2015</a:t>
+              <a:t>10/4/2015</a:t>
             </a:fld>
             <a:endParaRPr lang="en-US"/>
           </a:p>
@@ -903,7 +906,7 @@
           <a:p>
             <a:fld id="{F635EFCD-DE28-441F-88C5-3E2C5E31EA82}" type="datetimeFigureOut">
               <a:rPr lang="en-US" smtClean="0"/>
-              <a:t>2/14/2015</a:t>
+              <a:t>10/4/2015</a:t>
             </a:fld>
             <a:endParaRPr lang="en-US"/>
           </a:p>
@@ -1083,7 +1086,7 @@
           <a:p>
             <a:fld id="{F635EFCD-DE28-441F-88C5-3E2C5E31EA82}" type="datetimeFigureOut">
               <a:rPr lang="en-US" smtClean="0"/>
-              <a:t>2/14/2015</a:t>
+              <a:t>10/4/2015</a:t>
             </a:fld>
             <a:endParaRPr lang="en-US"/>
           </a:p>
@@ -1253,7 +1256,7 @@
           <a:p>
             <a:fld id="{F635EFCD-DE28-441F-88C5-3E2C5E31EA82}" type="datetimeFigureOut">
               <a:rPr lang="en-US" smtClean="0"/>
-              <a:t>2/14/2015</a:t>
+              <a:t>10/4/2015</a:t>
             </a:fld>
             <a:endParaRPr lang="en-US"/>
           </a:p>
@@ -1499,7 +1502,7 @@
           <a:p>
             <a:fld id="{F635EFCD-DE28-441F-88C5-3E2C5E31EA82}" type="datetimeFigureOut">
               <a:rPr lang="en-US" smtClean="0"/>
-              <a:t>2/14/2015</a:t>
+              <a:t>10/4/2015</a:t>
             </a:fld>
             <a:endParaRPr lang="en-US"/>
           </a:p>
@@ -1731,7 +1734,7 @@
           <a:p>
             <a:fld id="{F635EFCD-DE28-441F-88C5-3E2C5E31EA82}" type="datetimeFigureOut">
               <a:rPr lang="en-US" smtClean="0"/>
-              <a:t>2/14/2015</a:t>
+              <a:t>10/4/2015</a:t>
             </a:fld>
             <a:endParaRPr lang="en-US"/>
           </a:p>
@@ -2098,7 +2101,7 @@
           <a:p>
             <a:fld id="{F635EFCD-DE28-441F-88C5-3E2C5E31EA82}" type="datetimeFigureOut">
               <a:rPr lang="en-US" smtClean="0"/>
-              <a:t>2/14/2015</a:t>
+              <a:t>10/4/2015</a:t>
             </a:fld>
             <a:endParaRPr lang="en-US"/>
           </a:p>
@@ -2216,7 +2219,7 @@
           <a:p>
             <a:fld id="{F635EFCD-DE28-441F-88C5-3E2C5E31EA82}" type="datetimeFigureOut">
               <a:rPr lang="en-US" smtClean="0"/>
-              <a:t>2/14/2015</a:t>
+              <a:t>10/4/2015</a:t>
             </a:fld>
             <a:endParaRPr lang="en-US"/>
           </a:p>
@@ -2311,7 +2314,7 @@
           <a:p>
             <a:fld id="{F635EFCD-DE28-441F-88C5-3E2C5E31EA82}" type="datetimeFigureOut">
               <a:rPr lang="en-US" smtClean="0"/>
-              <a:t>2/14/2015</a:t>
+              <a:t>10/4/2015</a:t>
             </a:fld>
             <a:endParaRPr lang="en-US"/>
           </a:p>
@@ -2588,7 +2591,7 @@
           <a:p>
             <a:fld id="{F635EFCD-DE28-441F-88C5-3E2C5E31EA82}" type="datetimeFigureOut">
               <a:rPr lang="en-US" smtClean="0"/>
-              <a:t>2/14/2015</a:t>
+              <a:t>10/4/2015</a:t>
             </a:fld>
             <a:endParaRPr lang="en-US"/>
           </a:p>
@@ -2841,7 +2844,7 @@
           <a:p>
             <a:fld id="{F635EFCD-DE28-441F-88C5-3E2C5E31EA82}" type="datetimeFigureOut">
               <a:rPr lang="en-US" smtClean="0"/>
-              <a:t>2/14/2015</a:t>
+              <a:t>10/4/2015</a:t>
             </a:fld>
             <a:endParaRPr lang="en-US"/>
           </a:p>
@@ -3054,7 +3057,7 @@
           <a:p>
             <a:fld id="{F635EFCD-DE28-441F-88C5-3E2C5E31EA82}" type="datetimeFigureOut">
               <a:rPr lang="en-US" smtClean="0"/>
-              <a:t>2/14/2015</a:t>
+              <a:t>10/4/2015</a:t>
             </a:fld>
             <a:endParaRPr lang="en-US"/>
           </a:p>
@@ -3507,7 +3510,6 @@
               <a:rPr lang="en-US" dirty="0" smtClean="0"/>
               <a:t>15 February 2015</a:t>
             </a:r>
-            <a:endParaRPr lang="en-US" dirty="0" smtClean="0"/>
           </a:p>
           <a:p>
             <a:endParaRPr lang="en-US" dirty="0"/>
@@ -5581,11 +5583,7 @@
           <a:p>
             <a:r>
               <a:rPr lang="en-US" dirty="0" smtClean="0"/>
-              <a:t>9-DoF </a:t>
-            </a:r>
-            <a:r>
-              <a:rPr lang="en-US" dirty="0" smtClean="0"/>
-              <a:t>IMU (</a:t>
+              <a:t>9-DoF IMU (</a:t>
             </a:r>
             <a:endParaRPr lang="en-US" dirty="0"/>
           </a:p>
@@ -6422,15 +6420,7 @@
           <a:p>
             <a:r>
               <a:rPr lang="en-US" dirty="0" smtClean="0"/>
-              <a:t>Open the </a:t>
-            </a:r>
-            <a:r>
-              <a:rPr lang="en-US" dirty="0" smtClean="0"/>
-              <a:t>ahrs_lsm9ds0 </a:t>
-            </a:r>
-            <a:r>
-              <a:rPr lang="en-US" dirty="0" smtClean="0"/>
-              <a:t>example</a:t>
+              <a:t>Open the ahrs_lsm9ds0 example</a:t>
             </a:r>
             <a:endParaRPr lang="en-US" dirty="0"/>
           </a:p>
@@ -6927,6 +6917,36 @@
       </p:grpSpPr>
       <p:pic>
         <p:nvPicPr>
+          <p:cNvPr id="5" name="Picture 4"/>
+          <p:cNvPicPr>
+            <a:picLocks noChangeAspect="1"/>
+          </p:cNvPicPr>
+          <p:nvPr/>
+        </p:nvPicPr>
+        <p:blipFill>
+          <a:blip r:embed="rId2">
+            <a:extLst>
+              <a:ext uri="{28A0092B-C50C-407E-A947-70E740481C1C}">
+                <a14:useLocalDpi xmlns:a14="http://schemas.microsoft.com/office/drawing/2010/main" val="0"/>
+              </a:ext>
+            </a:extLst>
+          </a:blip>
+          <a:stretch>
+            <a:fillRect/>
+          </a:stretch>
+        </p:blipFill>
+        <p:spPr>
+          <a:xfrm>
+            <a:off x="1078634" y="3079795"/>
+            <a:ext cx="4836251" cy="2197239"/>
+          </a:xfrm>
+          <a:prstGeom prst="rect">
+            <a:avLst/>
+          </a:prstGeom>
+        </p:spPr>
+      </p:pic>
+      <p:pic>
+        <p:nvPicPr>
           <p:cNvPr id="4" name="Picture 3"/>
           <p:cNvPicPr>
             <a:picLocks noChangeAspect="1"/>
@@ -6934,7 +6954,7 @@
           <p:nvPr/>
         </p:nvPicPr>
         <p:blipFill>
-          <a:blip r:embed="rId2">
+          <a:blip r:embed="rId3">
             <a:extLst>
               <a:ext uri="{28A0092B-C50C-407E-A947-70E740481C1C}">
                 <a14:useLocalDpi xmlns:a14="http://schemas.microsoft.com/office/drawing/2010/main" val="0"/>
@@ -7006,41 +7026,32 @@
           <a:p>
             <a:r>
               <a:rPr lang="en-US" dirty="0" smtClean="0"/>
-              <a:t>Demodulates remote control signals (38 kHz modulation)</a:t>
-            </a:r>
-          </a:p>
-        </p:txBody>
-      </p:sp>
-      <p:pic>
-        <p:nvPicPr>
-          <p:cNvPr id="5" name="Picture 4"/>
-          <p:cNvPicPr>
-            <a:picLocks noChangeAspect="1"/>
-          </p:cNvPicPr>
-          <p:nvPr/>
-        </p:nvPicPr>
-        <p:blipFill>
-          <a:blip r:embed="rId3">
-            <a:extLst>
-              <a:ext uri="{28A0092B-C50C-407E-A947-70E740481C1C}">
-                <a14:useLocalDpi xmlns:a14="http://schemas.microsoft.com/office/drawing/2010/main" val="0"/>
-              </a:ext>
-            </a:extLst>
-          </a:blip>
-          <a:stretch>
-            <a:fillRect/>
-          </a:stretch>
-        </p:blipFill>
-        <p:spPr>
-          <a:xfrm>
-            <a:off x="1078635" y="2816352"/>
-            <a:ext cx="4836251" cy="2197239"/>
-          </a:xfrm>
-          <a:prstGeom prst="rect">
-            <a:avLst/>
-          </a:prstGeom>
-        </p:spPr>
-      </p:pic>
+              <a:t>Demodulates remote control signals (38 kHz modulation</a:t>
+            </a:r>
+            <a:r>
+              <a:rPr lang="en-US" dirty="0" smtClean="0"/>
+              <a:t>)</a:t>
+            </a:r>
+          </a:p>
+          <a:p>
+            <a:r>
+              <a:rPr lang="en-US" dirty="0" smtClean="0"/>
+              <a:t>Active low </a:t>
+            </a:r>
+            <a:r>
+              <a:rPr lang="en-US" dirty="0"/>
+              <a:t>o</a:t>
+            </a:r>
+            <a:r>
+              <a:rPr lang="en-US" dirty="0" smtClean="0"/>
+              <a:t>utput</a:t>
+            </a:r>
+          </a:p>
+          <a:p>
+            <a:endParaRPr lang="en-US" dirty="0" smtClean="0"/>
+          </a:p>
+        </p:txBody>
+      </p:sp>
       <p:pic>
         <p:nvPicPr>
           <p:cNvPr id="6" name="Picture 5"/>
@@ -7063,7 +7074,7 @@
         </p:blipFill>
         <p:spPr>
           <a:xfrm>
-            <a:off x="1078635" y="4589226"/>
+            <a:off x="1078634" y="4770351"/>
             <a:ext cx="4836251" cy="2087649"/>
           </a:xfrm>
           <a:prstGeom prst="rect">
@@ -7108,6 +7119,430 @@
           <a:chExt cx="0" cy="0"/>
         </a:xfrm>
       </p:grpSpPr>
+      <p:pic>
+        <p:nvPicPr>
+          <p:cNvPr id="5" name="Picture 4"/>
+          <p:cNvPicPr>
+            <a:picLocks noChangeAspect="1"/>
+          </p:cNvPicPr>
+          <p:nvPr/>
+        </p:nvPicPr>
+        <p:blipFill>
+          <a:blip r:embed="rId2">
+            <a:extLst>
+              <a:ext uri="{28A0092B-C50C-407E-A947-70E740481C1C}">
+                <a14:useLocalDpi xmlns:a14="http://schemas.microsoft.com/office/drawing/2010/main" val="0"/>
+              </a:ext>
+            </a:extLst>
+          </a:blip>
+          <a:stretch>
+            <a:fillRect/>
+          </a:stretch>
+        </p:blipFill>
+        <p:spPr>
+          <a:xfrm>
+            <a:off x="2682816" y="1825625"/>
+            <a:ext cx="8246024" cy="4624276"/>
+          </a:xfrm>
+          <a:prstGeom prst="rect">
+            <a:avLst/>
+          </a:prstGeom>
+        </p:spPr>
+      </p:pic>
+      <p:sp>
+        <p:nvSpPr>
+          <p:cNvPr id="2" name="Title 1"/>
+          <p:cNvSpPr>
+            <a:spLocks noGrp="1"/>
+          </p:cNvSpPr>
+          <p:nvPr>
+            <p:ph type="title"/>
+          </p:nvPr>
+        </p:nvSpPr>
+        <p:spPr/>
+        <p:txBody>
+          <a:bodyPr/>
+          <a:lstStyle/>
+          <a:p>
+            <a:r>
+              <a:rPr lang="en-US" dirty="0" smtClean="0"/>
+              <a:t>Serial IR </a:t>
+            </a:r>
+            <a:r>
+              <a:rPr lang="en-US" dirty="0" smtClean="0"/>
+              <a:t>transmitter hookup</a:t>
+            </a:r>
+            <a:endParaRPr lang="en-US" dirty="0"/>
+          </a:p>
+        </p:txBody>
+      </p:sp>
+      <p:sp>
+        <p:nvSpPr>
+          <p:cNvPr id="3" name="Content Placeholder 2"/>
+          <p:cNvSpPr>
+            <a:spLocks noGrp="1"/>
+          </p:cNvSpPr>
+          <p:nvPr>
+            <p:ph idx="1"/>
+          </p:nvPr>
+        </p:nvSpPr>
+        <p:spPr>
+          <a:xfrm>
+            <a:off x="838199" y="1825625"/>
+            <a:ext cx="6615023" cy="1029718"/>
+          </a:xfrm>
+        </p:spPr>
+        <p:txBody>
+          <a:bodyPr>
+            <a:normAutofit/>
+          </a:bodyPr>
+          <a:lstStyle/>
+          <a:p>
+            <a:r>
+              <a:rPr lang="en-US" sz="2400" dirty="0" smtClean="0"/>
+              <a:t>Connect transmitter as shown.</a:t>
+            </a:r>
+          </a:p>
+          <a:p>
+            <a:r>
+              <a:rPr lang="en-US" sz="2400" dirty="0" smtClean="0"/>
+              <a:t>Connect output of IR receiver to D0 (RX)</a:t>
+            </a:r>
+            <a:endParaRPr lang="en-US" sz="2400" dirty="0"/>
+          </a:p>
+        </p:txBody>
+      </p:sp>
+      <p:sp>
+        <p:nvSpPr>
+          <p:cNvPr id="6" name="TextBox 5"/>
+          <p:cNvSpPr txBox="1"/>
+          <p:nvPr/>
+        </p:nvSpPr>
+        <p:spPr>
+          <a:xfrm>
+            <a:off x="838199" y="4689386"/>
+            <a:ext cx="6029865" cy="1569660"/>
+          </a:xfrm>
+          <a:prstGeom prst="rect">
+            <a:avLst/>
+          </a:prstGeom>
+          <a:noFill/>
+        </p:spPr>
+        <p:txBody>
+          <a:bodyPr wrap="square" rtlCol="0">
+            <a:spAutoFit/>
+          </a:bodyPr>
+          <a:lstStyle/>
+          <a:p>
+            <a:pPr marL="285750" indent="-285750">
+              <a:buFont typeface="Arial" panose="020B0604020202020204" pitchFamily="34" charset="0"/>
+              <a:buChar char="•"/>
+            </a:pPr>
+            <a:r>
+              <a:rPr lang="en-US" sz="2400" dirty="0" smtClean="0"/>
+              <a:t>D10 is used as an output for the Tone library.</a:t>
+            </a:r>
+          </a:p>
+          <a:p>
+            <a:pPr marL="285750" indent="-285750">
+              <a:buFont typeface="Arial" panose="020B0604020202020204" pitchFamily="34" charset="0"/>
+              <a:buChar char="•"/>
+            </a:pPr>
+            <a:r>
+              <a:rPr lang="en-US" sz="2400" dirty="0" smtClean="0"/>
+              <a:t>The NOR output is high only when both inputs are low… which produces a matching signal to D1 on the  IR receiver output.</a:t>
+            </a:r>
+            <a:endParaRPr lang="en-US" sz="2400" dirty="0"/>
+          </a:p>
+        </p:txBody>
+      </p:sp>
+    </p:spTree>
+    <p:extLst>
+      <p:ext uri="{BB962C8B-B14F-4D97-AF65-F5344CB8AC3E}">
+        <p14:creationId xmlns:p14="http://schemas.microsoft.com/office/powerpoint/2010/main" val="152796696"/>
+      </p:ext>
+    </p:extLst>
+  </p:cSld>
+  <p:clrMapOvr>
+    <a:masterClrMapping/>
+  </p:clrMapOvr>
+  <p:timing>
+    <p:tnLst>
+      <p:par>
+        <p:cTn id="1" dur="indefinite" restart="never" nodeType="tmRoot"/>
+      </p:par>
+    </p:tnLst>
+  </p:timing>
+</p:sld>
+</file>
+
+<file path=ppt/slides/slide37.xml><?xml version="1.0" encoding="utf-8"?>
+<p:sld xmlns:a="http://schemas.openxmlformats.org/drawingml/2006/main" xmlns:r="http://schemas.openxmlformats.org/officeDocument/2006/relationships" xmlns:p="http://schemas.openxmlformats.org/presentationml/2006/main">
+  <p:cSld>
+    <p:spTree>
+      <p:nvGrpSpPr>
+        <p:cNvPr id="1" name=""/>
+        <p:cNvGrpSpPr/>
+        <p:nvPr/>
+      </p:nvGrpSpPr>
+      <p:grpSpPr>
+        <a:xfrm>
+          <a:off x="0" y="0"/>
+          <a:ext cx="0" cy="0"/>
+          <a:chOff x="0" y="0"/>
+          <a:chExt cx="0" cy="0"/>
+        </a:xfrm>
+      </p:grpSpPr>
+      <p:sp>
+        <p:nvSpPr>
+          <p:cNvPr id="2" name="Title 1"/>
+          <p:cNvSpPr>
+            <a:spLocks noGrp="1"/>
+          </p:cNvSpPr>
+          <p:nvPr>
+            <p:ph type="title"/>
+          </p:nvPr>
+        </p:nvSpPr>
+        <p:spPr/>
+        <p:txBody>
+          <a:bodyPr/>
+          <a:lstStyle/>
+          <a:p>
+            <a:r>
+              <a:rPr lang="en-US" dirty="0" smtClean="0"/>
+              <a:t>Serial IR demo code</a:t>
+            </a:r>
+            <a:endParaRPr lang="en-US" dirty="0"/>
+          </a:p>
+        </p:txBody>
+      </p:sp>
+      <p:sp>
+        <p:nvSpPr>
+          <p:cNvPr id="3" name="Content Placeholder 2"/>
+          <p:cNvSpPr>
+            <a:spLocks noGrp="1"/>
+          </p:cNvSpPr>
+          <p:nvPr>
+            <p:ph idx="1"/>
+          </p:nvPr>
+        </p:nvSpPr>
+        <p:spPr/>
+        <p:txBody>
+          <a:bodyPr/>
+          <a:lstStyle/>
+          <a:p>
+            <a:r>
+              <a:rPr lang="en-US" dirty="0" smtClean="0"/>
+              <a:t>Load </a:t>
+            </a:r>
+            <a:r>
+              <a:rPr lang="en-US" dirty="0" err="1" smtClean="0">
+                <a:latin typeface="Courier New" panose="02070309020205020404" pitchFamily="49" charset="0"/>
+                <a:cs typeface="Courier New" panose="02070309020205020404" pitchFamily="49" charset="0"/>
+              </a:rPr>
+              <a:t>serialIRtransmitter.ino</a:t>
+            </a:r>
+            <a:r>
+              <a:rPr lang="en-US" dirty="0" smtClean="0"/>
+              <a:t> on one Arduino and </a:t>
+            </a:r>
+            <a:r>
+              <a:rPr lang="en-US" dirty="0" err="1" smtClean="0">
+                <a:latin typeface="Courier New" panose="02070309020205020404" pitchFamily="49" charset="0"/>
+                <a:cs typeface="Courier New" panose="02070309020205020404" pitchFamily="49" charset="0"/>
+              </a:rPr>
+              <a:t>serialIRreceiver.ino</a:t>
+            </a:r>
+            <a:r>
+              <a:rPr lang="en-US" dirty="0" smtClean="0"/>
+              <a:t> on another. Start serial monitor on the receiver side at 2400 baud</a:t>
+            </a:r>
+          </a:p>
+          <a:p>
+            <a:r>
+              <a:rPr lang="en-US" dirty="0" smtClean="0"/>
+              <a:t>Point the LED at the receiver. Note that the </a:t>
+            </a:r>
+            <a:r>
+              <a:rPr lang="en-US" dirty="0" err="1" smtClean="0"/>
+              <a:t>beamwidth</a:t>
+            </a:r>
+            <a:r>
+              <a:rPr lang="en-US" dirty="0" smtClean="0"/>
+              <a:t> is very narrow, so this may take a few tries.</a:t>
+            </a:r>
+          </a:p>
+          <a:p>
+            <a:r>
+              <a:rPr lang="en-US" dirty="0" smtClean="0"/>
+              <a:t>Watch the serial monitor for signs of contact.</a:t>
+            </a:r>
+          </a:p>
+          <a:p>
+            <a:r>
+              <a:rPr lang="en-US" dirty="0" smtClean="0"/>
+              <a:t>Try moving the two sides apart. </a:t>
+            </a:r>
+          </a:p>
+          <a:p>
+            <a:endParaRPr lang="en-US" dirty="0"/>
+          </a:p>
+        </p:txBody>
+      </p:sp>
+    </p:spTree>
+    <p:extLst>
+      <p:ext uri="{BB962C8B-B14F-4D97-AF65-F5344CB8AC3E}">
+        <p14:creationId xmlns:p14="http://schemas.microsoft.com/office/powerpoint/2010/main" val="2345928098"/>
+      </p:ext>
+    </p:extLst>
+  </p:cSld>
+  <p:clrMapOvr>
+    <a:masterClrMapping/>
+  </p:clrMapOvr>
+  <p:timing>
+    <p:tnLst>
+      <p:par>
+        <p:cTn id="1" dur="indefinite" restart="never" nodeType="tmRoot"/>
+      </p:par>
+    </p:tnLst>
+  </p:timing>
+</p:sld>
+</file>
+
+<file path=ppt/slides/slide38.xml><?xml version="1.0" encoding="utf-8"?>
+<p:sld xmlns:a="http://schemas.openxmlformats.org/drawingml/2006/main" xmlns:r="http://schemas.openxmlformats.org/officeDocument/2006/relationships" xmlns:p="http://schemas.openxmlformats.org/presentationml/2006/main">
+  <p:cSld>
+    <p:spTree>
+      <p:nvGrpSpPr>
+        <p:cNvPr id="1" name=""/>
+        <p:cNvGrpSpPr/>
+        <p:nvPr/>
+      </p:nvGrpSpPr>
+      <p:grpSpPr>
+        <a:xfrm>
+          <a:off x="0" y="0"/>
+          <a:ext cx="0" cy="0"/>
+          <a:chOff x="0" y="0"/>
+          <a:chExt cx="0" cy="0"/>
+        </a:xfrm>
+      </p:grpSpPr>
+      <p:sp>
+        <p:nvSpPr>
+          <p:cNvPr id="2" name="Title 1"/>
+          <p:cNvSpPr>
+            <a:spLocks noGrp="1"/>
+          </p:cNvSpPr>
+          <p:nvPr>
+            <p:ph type="title"/>
+          </p:nvPr>
+        </p:nvSpPr>
+        <p:spPr/>
+        <p:txBody>
+          <a:bodyPr/>
+          <a:lstStyle/>
+          <a:p>
+            <a:r>
+              <a:rPr lang="en-US" dirty="0" smtClean="0"/>
+              <a:t>Serial IR code</a:t>
+            </a:r>
+            <a:endParaRPr lang="en-US" dirty="0"/>
+          </a:p>
+        </p:txBody>
+      </p:sp>
+      <p:pic>
+        <p:nvPicPr>
+          <p:cNvPr id="4" name="Content Placeholder 3"/>
+          <p:cNvPicPr>
+            <a:picLocks noGrp="1" noChangeAspect="1"/>
+          </p:cNvPicPr>
+          <p:nvPr>
+            <p:ph idx="1"/>
+          </p:nvPr>
+        </p:nvPicPr>
+        <p:blipFill rotWithShape="1">
+          <a:blip r:embed="rId2">
+            <a:extLst>
+              <a:ext uri="{28A0092B-C50C-407E-A947-70E740481C1C}">
+                <a14:useLocalDpi xmlns:a14="http://schemas.microsoft.com/office/drawing/2010/main" val="0"/>
+              </a:ext>
+            </a:extLst>
+          </a:blip>
+          <a:srcRect r="64276"/>
+          <a:stretch/>
+        </p:blipFill>
+        <p:spPr>
+          <a:xfrm>
+            <a:off x="303616" y="1690688"/>
+            <a:ext cx="3947542" cy="4341144"/>
+          </a:xfrm>
+        </p:spPr>
+      </p:pic>
+      <p:pic>
+        <p:nvPicPr>
+          <p:cNvPr id="5" name="Picture 4"/>
+          <p:cNvPicPr>
+            <a:picLocks noChangeAspect="1"/>
+          </p:cNvPicPr>
+          <p:nvPr/>
+        </p:nvPicPr>
+        <p:blipFill rotWithShape="1">
+          <a:blip r:embed="rId3">
+            <a:extLst>
+              <a:ext uri="{28A0092B-C50C-407E-A947-70E740481C1C}">
+                <a14:useLocalDpi xmlns:a14="http://schemas.microsoft.com/office/drawing/2010/main" val="0"/>
+              </a:ext>
+            </a:extLst>
+          </a:blip>
+          <a:srcRect r="12176"/>
+          <a:stretch/>
+        </p:blipFill>
+        <p:spPr>
+          <a:xfrm>
+            <a:off x="4755789" y="1217414"/>
+            <a:ext cx="6826611" cy="4814418"/>
+          </a:xfrm>
+          <a:prstGeom prst="rect">
+            <a:avLst/>
+          </a:prstGeom>
+        </p:spPr>
+      </p:pic>
+    </p:spTree>
+    <p:extLst>
+      <p:ext uri="{BB962C8B-B14F-4D97-AF65-F5344CB8AC3E}">
+        <p14:creationId xmlns:p14="http://schemas.microsoft.com/office/powerpoint/2010/main" val="3147625710"/>
+      </p:ext>
+    </p:extLst>
+  </p:cSld>
+  <p:clrMapOvr>
+    <a:masterClrMapping/>
+  </p:clrMapOvr>
+  <p:timing>
+    <p:tnLst>
+      <p:par>
+        <p:cTn id="1" dur="indefinite" restart="never" nodeType="tmRoot"/>
+      </p:par>
+    </p:tnLst>
+  </p:timing>
+</p:sld>
+</file>
+
+<file path=ppt/slides/slide39.xml><?xml version="1.0" encoding="utf-8"?>
+<p:sld xmlns:a="http://schemas.openxmlformats.org/drawingml/2006/main" xmlns:r="http://schemas.openxmlformats.org/officeDocument/2006/relationships" xmlns:p="http://schemas.openxmlformats.org/presentationml/2006/main">
+  <p:cSld>
+    <p:spTree>
+      <p:nvGrpSpPr>
+        <p:cNvPr id="1" name=""/>
+        <p:cNvGrpSpPr/>
+        <p:nvPr/>
+      </p:nvGrpSpPr>
+      <p:grpSpPr>
+        <a:xfrm>
+          <a:off x="0" y="0"/>
+          <a:ext cx="0" cy="0"/>
+          <a:chOff x="0" y="0"/>
+          <a:chExt cx="0" cy="0"/>
+        </a:xfrm>
+      </p:grpSpPr>
       <p:sp>
         <p:nvSpPr>
           <p:cNvPr id="2" name="Title 1"/>
@@ -7369,7 +7804,137 @@
 </p:sld>
 </file>
 
-<file path=ppt/slides/slide37.xml><?xml version="1.0" encoding="utf-8"?>
+<file path=ppt/slides/slide4.xml><?xml version="1.0" encoding="utf-8"?>
+<p:sld xmlns:a="http://schemas.openxmlformats.org/drawingml/2006/main" xmlns:r="http://schemas.openxmlformats.org/officeDocument/2006/relationships" xmlns:p="http://schemas.openxmlformats.org/presentationml/2006/main">
+  <p:cSld>
+    <p:spTree>
+      <p:nvGrpSpPr>
+        <p:cNvPr id="1" name=""/>
+        <p:cNvGrpSpPr/>
+        <p:nvPr/>
+      </p:nvGrpSpPr>
+      <p:grpSpPr>
+        <a:xfrm>
+          <a:off x="0" y="0"/>
+          <a:ext cx="0" cy="0"/>
+          <a:chOff x="0" y="0"/>
+          <a:chExt cx="0" cy="0"/>
+        </a:xfrm>
+      </p:grpSpPr>
+      <p:sp>
+        <p:nvSpPr>
+          <p:cNvPr id="2" name="Title 1"/>
+          <p:cNvSpPr>
+            <a:spLocks noGrp="1"/>
+          </p:cNvSpPr>
+          <p:nvPr>
+            <p:ph type="title"/>
+          </p:nvPr>
+        </p:nvSpPr>
+        <p:spPr/>
+        <p:txBody>
+          <a:bodyPr/>
+          <a:lstStyle/>
+          <a:p>
+            <a:r>
+              <a:rPr lang="en-US" dirty="0" smtClean="0"/>
+              <a:t>Aliasing</a:t>
+            </a:r>
+            <a:endParaRPr lang="en-US" dirty="0"/>
+          </a:p>
+        </p:txBody>
+      </p:sp>
+      <p:sp>
+        <p:nvSpPr>
+          <p:cNvPr id="3" name="Content Placeholder 2"/>
+          <p:cNvSpPr>
+            <a:spLocks noGrp="1"/>
+          </p:cNvSpPr>
+          <p:nvPr>
+            <p:ph idx="1"/>
+          </p:nvPr>
+        </p:nvSpPr>
+        <p:spPr>
+          <a:xfrm>
+            <a:off x="838200" y="1825625"/>
+            <a:ext cx="5579853" cy="4351338"/>
+          </a:xfrm>
+        </p:spPr>
+        <p:txBody>
+          <a:bodyPr/>
+          <a:lstStyle/>
+          <a:p>
+            <a:r>
+              <a:rPr lang="en-US" dirty="0" smtClean="0"/>
+              <a:t>Since we’re only measuring at discrete times, it’s possible to get fooled. </a:t>
+            </a:r>
+          </a:p>
+          <a:p>
+            <a:r>
+              <a:rPr lang="en-US" dirty="0" smtClean="0"/>
+              <a:t>Higher frequency signals can masquerade as lower frequency signals.</a:t>
+            </a:r>
+          </a:p>
+          <a:p>
+            <a:r>
+              <a:rPr lang="en-US" dirty="0" smtClean="0"/>
+              <a:t>No way to tell the difference post sampling. </a:t>
+            </a:r>
+            <a:endParaRPr lang="en-US" dirty="0"/>
+          </a:p>
+        </p:txBody>
+      </p:sp>
+      <p:pic>
+        <p:nvPicPr>
+          <p:cNvPr id="4" name="Picture 3"/>
+          <p:cNvPicPr>
+            <a:picLocks noChangeAspect="1"/>
+          </p:cNvPicPr>
+          <p:nvPr/>
+        </p:nvPicPr>
+        <p:blipFill>
+          <a:blip r:embed="rId3">
+            <a:extLst>
+              <a:ext uri="{28A0092B-C50C-407E-A947-70E740481C1C}">
+                <a14:useLocalDpi xmlns:a14="http://schemas.microsoft.com/office/drawing/2010/main" val="0"/>
+              </a:ext>
+            </a:extLst>
+          </a:blip>
+          <a:stretch>
+            <a:fillRect/>
+          </a:stretch>
+        </p:blipFill>
+        <p:spPr>
+          <a:xfrm>
+            <a:off x="6127646" y="1690688"/>
+            <a:ext cx="5935047" cy="4054504"/>
+          </a:xfrm>
+          <a:prstGeom prst="rect">
+            <a:avLst/>
+          </a:prstGeom>
+        </p:spPr>
+      </p:pic>
+    </p:spTree>
+    <p:extLst>
+      <p:ext uri="{BB962C8B-B14F-4D97-AF65-F5344CB8AC3E}">
+        <p14:creationId xmlns:p14="http://schemas.microsoft.com/office/powerpoint/2010/main" val="3122339918"/>
+      </p:ext>
+    </p:extLst>
+  </p:cSld>
+  <p:clrMapOvr>
+    <a:masterClrMapping/>
+  </p:clrMapOvr>
+  <p:timing>
+    <p:tnLst>
+      <p:par>
+        <p:cTn id="1" dur="indefinite" restart="never" nodeType="tmRoot"/>
+      </p:par>
+    </p:tnLst>
+  </p:timing>
+</p:sld>
+</file>
+
+<file path=ppt/slides/slide40.xml><?xml version="1.0" encoding="utf-8"?>
 <p:sld xmlns:a="http://schemas.openxmlformats.org/drawingml/2006/main" xmlns:r="http://schemas.openxmlformats.org/officeDocument/2006/relationships" xmlns:p="http://schemas.openxmlformats.org/presentationml/2006/main">
   <p:cSld>
     <p:spTree>
@@ -8363,7 +8928,7 @@
 </p:sld>
 </file>
 
-<file path=ppt/slides/slide38.xml><?xml version="1.0" encoding="utf-8"?>
+<file path=ppt/slides/slide41.xml><?xml version="1.0" encoding="utf-8"?>
 <p:sld xmlns:a="http://schemas.openxmlformats.org/drawingml/2006/main" xmlns:r="http://schemas.openxmlformats.org/officeDocument/2006/relationships" xmlns:p="http://schemas.openxmlformats.org/presentationml/2006/main">
   <p:cSld>
     <p:spTree>
@@ -8492,136 +9057,6 @@
     <p:extLst>
       <p:ext uri="{BB962C8B-B14F-4D97-AF65-F5344CB8AC3E}">
         <p14:creationId xmlns:p14="http://schemas.microsoft.com/office/powerpoint/2010/main" val="541050337"/>
-      </p:ext>
-    </p:extLst>
-  </p:cSld>
-  <p:clrMapOvr>
-    <a:masterClrMapping/>
-  </p:clrMapOvr>
-  <p:timing>
-    <p:tnLst>
-      <p:par>
-        <p:cTn id="1" dur="indefinite" restart="never" nodeType="tmRoot"/>
-      </p:par>
-    </p:tnLst>
-  </p:timing>
-</p:sld>
-</file>
-
-<file path=ppt/slides/slide4.xml><?xml version="1.0" encoding="utf-8"?>
-<p:sld xmlns:a="http://schemas.openxmlformats.org/drawingml/2006/main" xmlns:r="http://schemas.openxmlformats.org/officeDocument/2006/relationships" xmlns:p="http://schemas.openxmlformats.org/presentationml/2006/main">
-  <p:cSld>
-    <p:spTree>
-      <p:nvGrpSpPr>
-        <p:cNvPr id="1" name=""/>
-        <p:cNvGrpSpPr/>
-        <p:nvPr/>
-      </p:nvGrpSpPr>
-      <p:grpSpPr>
-        <a:xfrm>
-          <a:off x="0" y="0"/>
-          <a:ext cx="0" cy="0"/>
-          <a:chOff x="0" y="0"/>
-          <a:chExt cx="0" cy="0"/>
-        </a:xfrm>
-      </p:grpSpPr>
-      <p:sp>
-        <p:nvSpPr>
-          <p:cNvPr id="2" name="Title 1"/>
-          <p:cNvSpPr>
-            <a:spLocks noGrp="1"/>
-          </p:cNvSpPr>
-          <p:nvPr>
-            <p:ph type="title"/>
-          </p:nvPr>
-        </p:nvSpPr>
-        <p:spPr/>
-        <p:txBody>
-          <a:bodyPr/>
-          <a:lstStyle/>
-          <a:p>
-            <a:r>
-              <a:rPr lang="en-US" dirty="0" smtClean="0"/>
-              <a:t>Aliasing</a:t>
-            </a:r>
-            <a:endParaRPr lang="en-US" dirty="0"/>
-          </a:p>
-        </p:txBody>
-      </p:sp>
-      <p:sp>
-        <p:nvSpPr>
-          <p:cNvPr id="3" name="Content Placeholder 2"/>
-          <p:cNvSpPr>
-            <a:spLocks noGrp="1"/>
-          </p:cNvSpPr>
-          <p:nvPr>
-            <p:ph idx="1"/>
-          </p:nvPr>
-        </p:nvSpPr>
-        <p:spPr>
-          <a:xfrm>
-            <a:off x="838200" y="1825625"/>
-            <a:ext cx="5579853" cy="4351338"/>
-          </a:xfrm>
-        </p:spPr>
-        <p:txBody>
-          <a:bodyPr/>
-          <a:lstStyle/>
-          <a:p>
-            <a:r>
-              <a:rPr lang="en-US" dirty="0" smtClean="0"/>
-              <a:t>Since we’re only measuring at discrete times, it’s possible to get fooled. </a:t>
-            </a:r>
-          </a:p>
-          <a:p>
-            <a:r>
-              <a:rPr lang="en-US" dirty="0" smtClean="0"/>
-              <a:t>Higher frequency signals can masquerade as lower frequency signals.</a:t>
-            </a:r>
-          </a:p>
-          <a:p>
-            <a:r>
-              <a:rPr lang="en-US" dirty="0" smtClean="0"/>
-              <a:t>No way to tell the difference post sampling. </a:t>
-            </a:r>
-            <a:endParaRPr lang="en-US" dirty="0"/>
-          </a:p>
-        </p:txBody>
-      </p:sp>
-      <p:pic>
-        <p:nvPicPr>
-          <p:cNvPr id="4" name="Picture 3"/>
-          <p:cNvPicPr>
-            <a:picLocks noChangeAspect="1"/>
-          </p:cNvPicPr>
-          <p:nvPr/>
-        </p:nvPicPr>
-        <p:blipFill>
-          <a:blip r:embed="rId3">
-            <a:extLst>
-              <a:ext uri="{28A0092B-C50C-407E-A947-70E740481C1C}">
-                <a14:useLocalDpi xmlns:a14="http://schemas.microsoft.com/office/drawing/2010/main" val="0"/>
-              </a:ext>
-            </a:extLst>
-          </a:blip>
-          <a:stretch>
-            <a:fillRect/>
-          </a:stretch>
-        </p:blipFill>
-        <p:spPr>
-          <a:xfrm>
-            <a:off x="6127646" y="1690688"/>
-            <a:ext cx="5935047" cy="4054504"/>
-          </a:xfrm>
-          <a:prstGeom prst="rect">
-            <a:avLst/>
-          </a:prstGeom>
-        </p:spPr>
-      </p:pic>
-    </p:spTree>
-    <p:extLst>
-      <p:ext uri="{BB962C8B-B14F-4D97-AF65-F5344CB8AC3E}">
-        <p14:creationId xmlns:p14="http://schemas.microsoft.com/office/powerpoint/2010/main" val="3122339918"/>
       </p:ext>
     </p:extLst>
   </p:cSld>

</xml_diff>